<commit_message>
Worked on user input
</commit_message>
<xml_diff>
--- a/DSA LAB I ASSIGNMENT.pptx
+++ b/DSA LAB I ASSIGNMENT.pptx
@@ -319,7 +319,7 @@
             <a:fld id="{1D8BD707-D9CF-40AE-B4C6-C98DA3205C09}" type="datetimeFigureOut">
               <a:rPr lang="en-US" smtClean="0"/>
               <a:pPr/>
-              <a:t>8/23/2025</a:t>
+              <a:t>8/24/2025</a:t>
             </a:fld>
             <a:endParaRPr lang="en-US"/>
           </a:p>
@@ -484,7 +484,7 @@
             <a:fld id="{1D8BD707-D9CF-40AE-B4C6-C98DA3205C09}" type="datetimeFigureOut">
               <a:rPr lang="en-US" smtClean="0"/>
               <a:pPr/>
-              <a:t>8/23/2025</a:t>
+              <a:t>8/24/2025</a:t>
             </a:fld>
             <a:endParaRPr lang="en-US"/>
           </a:p>
@@ -659,7 +659,7 @@
             <a:fld id="{1D8BD707-D9CF-40AE-B4C6-C98DA3205C09}" type="datetimeFigureOut">
               <a:rPr lang="en-US" smtClean="0"/>
               <a:pPr/>
-              <a:t>8/23/2025</a:t>
+              <a:t>8/24/2025</a:t>
             </a:fld>
             <a:endParaRPr lang="en-US"/>
           </a:p>
@@ -824,7 +824,7 @@
             <a:fld id="{1D8BD707-D9CF-40AE-B4C6-C98DA3205C09}" type="datetimeFigureOut">
               <a:rPr lang="en-US" smtClean="0"/>
               <a:pPr/>
-              <a:t>8/23/2025</a:t>
+              <a:t>8/24/2025</a:t>
             </a:fld>
             <a:endParaRPr lang="en-US"/>
           </a:p>
@@ -1066,7 +1066,7 @@
             <a:fld id="{1D8BD707-D9CF-40AE-B4C6-C98DA3205C09}" type="datetimeFigureOut">
               <a:rPr lang="en-US" smtClean="0"/>
               <a:pPr/>
-              <a:t>8/23/2025</a:t>
+              <a:t>8/24/2025</a:t>
             </a:fld>
             <a:endParaRPr lang="en-US"/>
           </a:p>
@@ -1348,7 +1348,7 @@
             <a:fld id="{1D8BD707-D9CF-40AE-B4C6-C98DA3205C09}" type="datetimeFigureOut">
               <a:rPr lang="en-US" smtClean="0"/>
               <a:pPr/>
-              <a:t>8/23/2025</a:t>
+              <a:t>8/24/2025</a:t>
             </a:fld>
             <a:endParaRPr lang="en-US"/>
           </a:p>
@@ -1764,7 +1764,7 @@
             <a:fld id="{1D8BD707-D9CF-40AE-B4C6-C98DA3205C09}" type="datetimeFigureOut">
               <a:rPr lang="en-US" smtClean="0"/>
               <a:pPr/>
-              <a:t>8/23/2025</a:t>
+              <a:t>8/24/2025</a:t>
             </a:fld>
             <a:endParaRPr lang="en-US"/>
           </a:p>
@@ -1878,7 +1878,7 @@
             <a:fld id="{1D8BD707-D9CF-40AE-B4C6-C98DA3205C09}" type="datetimeFigureOut">
               <a:rPr lang="en-US" smtClean="0"/>
               <a:pPr/>
-              <a:t>8/23/2025</a:t>
+              <a:t>8/24/2025</a:t>
             </a:fld>
             <a:endParaRPr lang="en-US"/>
           </a:p>
@@ -1970,7 +1970,7 @@
             <a:fld id="{1D8BD707-D9CF-40AE-B4C6-C98DA3205C09}" type="datetimeFigureOut">
               <a:rPr lang="en-US" smtClean="0"/>
               <a:pPr/>
-              <a:t>8/23/2025</a:t>
+              <a:t>8/24/2025</a:t>
             </a:fld>
             <a:endParaRPr lang="en-US"/>
           </a:p>
@@ -2242,7 +2242,7 @@
             <a:fld id="{1D8BD707-D9CF-40AE-B4C6-C98DA3205C09}" type="datetimeFigureOut">
               <a:rPr lang="en-US" smtClean="0"/>
               <a:pPr/>
-              <a:t>8/23/2025</a:t>
+              <a:t>8/24/2025</a:t>
             </a:fld>
             <a:endParaRPr lang="en-US"/>
           </a:p>
@@ -2491,7 +2491,7 @@
             <a:fld id="{1D8BD707-D9CF-40AE-B4C6-C98DA3205C09}" type="datetimeFigureOut">
               <a:rPr lang="en-US" smtClean="0"/>
               <a:pPr/>
-              <a:t>8/23/2025</a:t>
+              <a:t>8/24/2025</a:t>
             </a:fld>
             <a:endParaRPr lang="en-US"/>
           </a:p>
@@ -2699,7 +2699,7 @@
             <a:fld id="{1D8BD707-D9CF-40AE-B4C6-C98DA3205C09}" type="datetimeFigureOut">
               <a:rPr lang="en-US" smtClean="0"/>
               <a:pPr/>
-              <a:t>8/23/2025</a:t>
+              <a:t>8/24/2025</a:t>
             </a:fld>
             <a:endParaRPr lang="en-US"/>
           </a:p>

</xml_diff>